<commit_message>
adjusted and corrected excercise descriptions
</commit_message>
<xml_diff>
--- a/WDSR - ćwiczenie 1.pptx
+++ b/WDSR - ćwiczenie 1.pptx
@@ -158,7 +158,7 @@
   </p:defaultTextStyle>
   <p:extLst>
     <p:ext uri="{EFAFB233-063F-42B5-8137-9DF3F51BA10A}">
-      <p15:sldGuideLst xmlns:p15="http://schemas.microsoft.com/office/powerpoint/2012/main" xmlns="">
+      <p15:sldGuideLst xmlns:p15="http://schemas.microsoft.com/office/powerpoint/2012/main">
         <p15:guide id="1" orient="horz" pos="1620">
           <p15:clr>
             <a:srgbClr val="A4A3A4"/>
@@ -192,7 +192,7 @@
       </p15:sldGuideLst>
     </p:ext>
     <p:ext uri="{2D200454-40CA-4A62-9FC3-DE9A4176ACB9}">
-      <p15:notesGuideLst xmlns:p15="http://schemas.microsoft.com/office/powerpoint/2012/main" xmlns=""/>
+      <p15:notesGuideLst xmlns:p15="http://schemas.microsoft.com/office/powerpoint/2012/main"/>
     </p:ext>
   </p:extLst>
 </p:presentation>
@@ -287,7 +287,7 @@
             <a:fld id="{C4843D26-F355-3844-A4EF-19D4FD875597}" type="datetimeFigureOut">
               <a:rPr lang="de-DE" smtClean="0"/>
               <a:pPr/>
-              <a:t>22.02.2016</a:t>
+              <a:t>18.02.2017</a:t>
             </a:fld>
             <a:endParaRPr lang="de-DE" dirty="0"/>
           </a:p>
@@ -455,7 +455,7 @@
             <a:fld id="{8E2CFE12-C1FB-D740-8B6C-AFB72D5D4002}" type="datetimeFigureOut">
               <a:rPr lang="de-DE" smtClean="0"/>
               <a:pPr/>
-              <a:t>22.02.2016</a:t>
+              <a:t>18.02.2017</a:t>
             </a:fld>
             <a:endParaRPr lang="de-DE" dirty="0"/>
           </a:p>
@@ -5405,7 +5405,7 @@
   </p:timing>
   <p:extLst mod="1">
     <p:ext uri="{DCECCB84-F9BA-43D5-87BE-67443E8EF086}">
-      <p15:sldGuideLst xmlns:p15="http://schemas.microsoft.com/office/powerpoint/2012/main" xmlns="">
+      <p15:sldGuideLst xmlns:p15="http://schemas.microsoft.com/office/powerpoint/2012/main">
         <p15:guide id="1" orient="horz" pos="1221">
           <p15:clr>
             <a:srgbClr val="C35EA4"/>
@@ -5738,7 +5738,7 @@
   </p:clrMapOvr>
   <p:extLst mod="1">
     <p:ext uri="{DCECCB84-F9BA-43D5-87BE-67443E8EF086}">
-      <p15:sldGuideLst xmlns:p15="http://schemas.microsoft.com/office/powerpoint/2012/main" xmlns="">
+      <p15:sldGuideLst xmlns:p15="http://schemas.microsoft.com/office/powerpoint/2012/main">
         <p15:guide id="1" orient="horz" pos="1221">
           <p15:clr>
             <a:srgbClr val="C35EA4"/>
@@ -6477,7 +6477,7 @@
           <a:graphicData uri="http://schemas.openxmlformats.org/presentationml/2006/ole">
             <mc:AlternateContent xmlns:mc="http://schemas.openxmlformats.org/markup-compatibility/2006">
               <mc:Choice xmlns:v="urn:schemas-microsoft-com:vml" Requires="v">
-                <p:oleObj spid="_x0000_s2199" name="think-cell Folie" r:id="rId4" imgW="305" imgH="303" progId="TCLayout.ActiveDocument.1">
+                <p:oleObj spid="_x0000_s2201" name="think-cell Folie" r:id="rId4" imgW="305" imgH="303" progId="TCLayout.ActiveDocument.1">
                   <p:embed/>
                 </p:oleObj>
               </mc:Choice>
@@ -6874,7 +6874,7 @@
           <a:graphicData uri="http://schemas.openxmlformats.org/presentationml/2006/ole">
             <mc:AlternateContent xmlns:mc="http://schemas.openxmlformats.org/markup-compatibility/2006">
               <mc:Choice xmlns:v="urn:schemas-microsoft-com:vml" Requires="v">
-                <p:oleObj spid="_x0000_s1180" name="think-cell Folie" r:id="rId13" imgW="305" imgH="303" progId="TCLayout.ActiveDocument.1">
+                <p:oleObj spid="_x0000_s1182" name="think-cell Folie" r:id="rId13" imgW="305" imgH="303" progId="TCLayout.ActiveDocument.1">
                   <p:embed/>
                 </p:oleObj>
               </mc:Choice>
@@ -8082,7 +8082,7 @@
   </p:txStyles>
   <p:extLst mod="1">
     <p:ext uri="{27BBF7A9-308A-43DC-89C8-2F10F3537804}">
-      <p15:sldGuideLst xmlns:p15="http://schemas.microsoft.com/office/powerpoint/2012/main" xmlns="">
+      <p15:sldGuideLst xmlns:p15="http://schemas.microsoft.com/office/powerpoint/2012/main">
         <p15:guide id="1" pos="283">
           <p15:clr>
             <a:srgbClr val="FBAE40"/>
@@ -8210,20 +8210,29 @@
           <a:p>
             <a:r>
               <a:rPr lang="pl-PL" dirty="0" smtClean="0"/>
-              <a:t>Marek Strejczek</a:t>
+              <a:t>Prowdzący: Daniel Boguszewicz</a:t>
             </a:r>
             <a:endParaRPr lang="de-DE" dirty="0" smtClean="0"/>
           </a:p>
           <a:p>
             <a:r>
               <a:rPr lang="pl-PL" dirty="0" smtClean="0"/>
-              <a:t>Lato 2016</a:t>
-            </a:r>
-          </a:p>
-          <a:p>
-            <a:r>
-              <a:rPr lang="pl-PL" dirty="0" smtClean="0"/>
-              <a:t>Wersja 1.0</a:t>
+              <a:t>Lato </a:t>
+            </a:r>
+            <a:r>
+              <a:rPr lang="pl-PL" dirty="0" smtClean="0"/>
+              <a:t>2017</a:t>
+            </a:r>
+            <a:endParaRPr lang="pl-PL" dirty="0" smtClean="0"/>
+          </a:p>
+          <a:p>
+            <a:r>
+              <a:rPr lang="pl-PL" dirty="0" smtClean="0"/>
+              <a:t>Wersja </a:t>
+            </a:r>
+            <a:r>
+              <a:rPr lang="pl-PL" dirty="0" smtClean="0"/>
+              <a:t>1.1</a:t>
             </a:r>
             <a:endParaRPr lang="de-DE" dirty="0"/>
           </a:p>
@@ -13358,15 +13367,7 @@
                   <a:srgbClr val="00B050"/>
                 </a:solidFill>
               </a:rPr>
-              <a:t>1d: Dodanie testów jednostkowych do </a:t>
-            </a:r>
-            <a:r>
-              <a:rPr lang="pl-PL" dirty="0" smtClean="0">
-                <a:solidFill>
-                  <a:srgbClr val="00B050"/>
-                </a:solidFill>
-              </a:rPr>
-              <a:t>aplikacji</a:t>
+              <a:t>1d: Dodanie testów jednostkowych do aplikacji</a:t>
             </a:r>
           </a:p>
           <a:p>
@@ -13960,7 +13961,6 @@
               <a:rPr lang="pl-PL" dirty="0" smtClean="0"/>
               <a:t> W SYSTEMIE PRODUKCYJNYM !!! (na naszych zajęciach też nie)</a:t>
             </a:r>
-            <a:endParaRPr lang="pl-PL" dirty="0" smtClean="0"/>
           </a:p>
           <a:p>
             <a:pPr lvl="1"/>
@@ -14318,7 +14318,6 @@
               <a:rPr lang="pl-PL" dirty="0" smtClean="0"/>
               <a:t>Po dodaniu brakującej zależności wynik powinien wyglądać mniej więcej tak:</a:t>
             </a:r>
-            <a:endParaRPr lang="pl-PL" dirty="0" smtClean="0"/>
           </a:p>
           <a:p>
             <a:endParaRPr lang="pl-PL" dirty="0"/>
@@ -15873,7 +15872,6 @@
               <a:rPr lang="pl-PL" dirty="0" smtClean="0"/>
               <a:t>).</a:t>
             </a:r>
-            <a:endParaRPr lang="pl-PL" dirty="0" smtClean="0"/>
           </a:p>
           <a:p>
             <a:pPr lvl="1"/>
@@ -16025,11 +16023,7 @@
           <a:p>
             <a:r>
               <a:rPr lang="pl-PL" dirty="0" smtClean="0"/>
-              <a:t>ĆWICZENIE </a:t>
-            </a:r>
-            <a:r>
-              <a:rPr lang="pl-PL" dirty="0" smtClean="0"/>
-              <a:t>1E</a:t>
+              <a:t>ĆWICZENIE 1E</a:t>
             </a:r>
             <a:endParaRPr lang="de-DE" dirty="0"/>
           </a:p>
@@ -16078,21 +16072,8 @@
                   <a:schemeClr val="tx1"/>
                 </a:solidFill>
               </a:rPr>
-              <a:t>Ćwiczenie </a:t>
-            </a:r>
-            <a:r>
-              <a:rPr lang="pl-PL" sz="1600" dirty="0" smtClean="0">
-                <a:solidFill>
-                  <a:schemeClr val="tx1"/>
-                </a:solidFill>
-              </a:rPr>
-              <a:t>1E</a:t>
-            </a:r>
-            <a:endParaRPr lang="pl-PL" sz="1600" dirty="0" smtClean="0">
-              <a:solidFill>
-                <a:schemeClr val="tx1"/>
-              </a:solidFill>
-            </a:endParaRPr>
+              <a:t>Ćwiczenie 1E</a:t>
+            </a:r>
           </a:p>
           <a:p>
             <a:pPr lvl="1"/>
@@ -16209,11 +16190,7 @@
           <a:p>
             <a:r>
               <a:rPr lang="pl-PL" dirty="0" smtClean="0"/>
-              <a:t>ĆWICZENIE </a:t>
-            </a:r>
-            <a:r>
-              <a:rPr lang="pl-PL" dirty="0" smtClean="0"/>
-              <a:t>1E</a:t>
+              <a:t>ĆWICZENIE 1E</a:t>
             </a:r>
             <a:endParaRPr lang="de-DE" dirty="0"/>
           </a:p>
@@ -16356,11 +16333,6 @@
               </a:rPr>
               <a:t>Obiekt testowany</a:t>
             </a:r>
-            <a:endParaRPr lang="pl-PL" sz="1200" dirty="0" smtClean="0">
-              <a:solidFill>
-                <a:schemeClr val="tx1"/>
-              </a:solidFill>
-            </a:endParaRPr>
           </a:p>
         </p:txBody>
       </p:sp>
@@ -16409,11 +16381,6 @@
               </a:rPr>
               <a:t>Baza danych</a:t>
             </a:r>
-            <a:endParaRPr lang="pl-PL" sz="1200" dirty="0" smtClean="0">
-              <a:solidFill>
-                <a:schemeClr val="tx1"/>
-              </a:solidFill>
-            </a:endParaRPr>
           </a:p>
         </p:txBody>
       </p:sp>
@@ -16462,11 +16429,6 @@
               </a:rPr>
               <a:t>Złożony obiekt</a:t>
             </a:r>
-            <a:endParaRPr lang="pl-PL" sz="1200" dirty="0" smtClean="0">
-              <a:solidFill>
-                <a:schemeClr val="tx1"/>
-              </a:solidFill>
-            </a:endParaRPr>
           </a:p>
         </p:txBody>
       </p:sp>
@@ -16595,11 +16557,6 @@
               </a:rPr>
               <a:t>Obiekt testowany</a:t>
             </a:r>
-            <a:endParaRPr lang="pl-PL" sz="1200" dirty="0" smtClean="0">
-              <a:solidFill>
-                <a:schemeClr val="tx1"/>
-              </a:solidFill>
-            </a:endParaRPr>
           </a:p>
         </p:txBody>
       </p:sp>
@@ -16656,11 +16613,6 @@
               </a:rPr>
               <a:t> bazy danych</a:t>
             </a:r>
-            <a:endParaRPr lang="pl-PL" sz="1200" dirty="0" smtClean="0">
-              <a:solidFill>
-                <a:schemeClr val="tx1"/>
-              </a:solidFill>
-            </a:endParaRPr>
           </a:p>
         </p:txBody>
       </p:sp>
@@ -16717,11 +16669,6 @@
               </a:rPr>
               <a:t> złożonego obiektu</a:t>
             </a:r>
-            <a:endParaRPr lang="pl-PL" sz="1200" dirty="0" smtClean="0">
-              <a:solidFill>
-                <a:schemeClr val="tx1"/>
-              </a:solidFill>
-            </a:endParaRPr>
           </a:p>
         </p:txBody>
       </p:sp>
@@ -16936,11 +16883,7 @@
           <a:p>
             <a:r>
               <a:rPr lang="pl-PL" dirty="0" smtClean="0"/>
-              <a:t>ĆWICZENIE </a:t>
-            </a:r>
-            <a:r>
-              <a:rPr lang="pl-PL" dirty="0" smtClean="0"/>
-              <a:t>1E</a:t>
+              <a:t>ĆWICZENIE 1E</a:t>
             </a:r>
             <a:endParaRPr lang="de-DE" dirty="0"/>
           </a:p>
@@ -17155,11 +17098,7 @@
           <a:p>
             <a:r>
               <a:rPr lang="pl-PL" dirty="0" smtClean="0"/>
-              <a:t>ĆWICZENIE </a:t>
-            </a:r>
-            <a:r>
-              <a:rPr lang="pl-PL" dirty="0" smtClean="0"/>
-              <a:t>1E</a:t>
+              <a:t>ĆWICZENIE 1E</a:t>
             </a:r>
             <a:endParaRPr lang="de-DE" dirty="0"/>
           </a:p>
@@ -17224,11 +17163,7 @@
             <a:pPr lvl="1"/>
             <a:r>
               <a:rPr lang="pl-PL" dirty="0" smtClean="0"/>
-              <a:t>Ta komenda usuwa wcześniej wygenerowane artefakty (o ile istnieją), po czym kompiluje kod aplikacji i testów, uruchamia testy i buduje aplikację</a:t>
-            </a:r>
-            <a:r>
-              <a:rPr lang="pl-PL" dirty="0" smtClean="0"/>
-              <a:t>.</a:t>
+              <a:t>Ta komenda usuwa wcześniej wygenerowane artefakty (o ile istnieją), po czym kompiluje kod aplikacji i testów, uruchamia testy i buduje aplikację.</a:t>
             </a:r>
           </a:p>
           <a:p>
@@ -17400,11 +17335,7 @@
           <a:p>
             <a:r>
               <a:rPr lang="pl-PL" dirty="0" smtClean="0"/>
-              <a:t>ĆWICZENIE </a:t>
-            </a:r>
-            <a:r>
-              <a:rPr lang="pl-PL" dirty="0" smtClean="0"/>
-              <a:t>1E</a:t>
+              <a:t>ĆWICZENIE 1E</a:t>
             </a:r>
             <a:endParaRPr lang="de-DE" dirty="0"/>
           </a:p>
@@ -17914,11 +17845,6 @@
               </a:rPr>
               <a:t>)</a:t>
             </a:r>
-            <a:endParaRPr lang="pl-PL" sz="1200" dirty="0" smtClean="0">
-              <a:solidFill>
-                <a:schemeClr val="bg1"/>
-              </a:solidFill>
-            </a:endParaRPr>
           </a:p>
         </p:txBody>
       </p:sp>
@@ -17967,11 +17893,6 @@
               </a:rPr>
               <a:t>Maszyna wirtualna JVM</a:t>
             </a:r>
-            <a:endParaRPr lang="pl-PL" sz="1200" dirty="0" smtClean="0">
-              <a:solidFill>
-                <a:schemeClr val="bg1"/>
-              </a:solidFill>
-            </a:endParaRPr>
           </a:p>
         </p:txBody>
       </p:sp>
@@ -18149,11 +18070,6 @@
               </a:rPr>
               <a:t>System operacyjny + sprzęt</a:t>
             </a:r>
-            <a:endParaRPr lang="pl-PL" sz="1200" dirty="0" smtClean="0">
-              <a:solidFill>
-                <a:schemeClr val="bg1"/>
-              </a:solidFill>
-            </a:endParaRPr>
           </a:p>
         </p:txBody>
       </p:sp>
@@ -18226,7 +18142,6 @@
               <a:rPr lang="pl-PL" sz="1050" dirty="0" smtClean="0"/>
               <a:t>Literatura:</a:t>
             </a:r>
-            <a:endParaRPr lang="pl-PL" sz="1050" dirty="0" smtClean="0"/>
           </a:p>
           <a:p>
             <a:pPr marL="171450" indent="-171450">
@@ -18375,7 +18290,6 @@
               <a:rPr lang="pl-PL" sz="900" dirty="0" smtClean="0"/>
               <a:t> umieszcza się (razem z innymi zasobami jak pliki konfiguracyjne) w plikach .jar (Java Archive).</a:t>
             </a:r>
-            <a:endParaRPr lang="pl-PL" sz="900" dirty="0" smtClean="0"/>
           </a:p>
         </p:txBody>
       </p:sp>
@@ -18405,7 +18319,6 @@
               <a:rPr lang="pl-PL" sz="900" dirty="0" smtClean="0"/>
               <a:t>Na przykład Windows x64 na IA64 albo Linux na ARM</a:t>
             </a:r>
-            <a:endParaRPr lang="pl-PL" sz="900" dirty="0" smtClean="0"/>
           </a:p>
         </p:txBody>
       </p:sp>
@@ -18638,11 +18551,7 @@
             </a:r>
             <a:r>
               <a:rPr lang="pl-PL" dirty="0" smtClean="0"/>
-              <a:t>„bin” JDK do zmiennej środowiskowej </a:t>
-            </a:r>
-            <a:r>
-              <a:rPr lang="pl-PL" dirty="0" smtClean="0"/>
-              <a:t>PATH</a:t>
+              <a:t>„bin” JDK do zmiennej środowiskowej PATH</a:t>
             </a:r>
           </a:p>
           <a:p>
@@ -18667,7 +18576,6 @@
               <a:rPr lang="pl-PL" dirty="0" smtClean="0"/>
               <a:t>\)</a:t>
             </a:r>
-            <a:endParaRPr lang="pl-PL" dirty="0" smtClean="0"/>
           </a:p>
           <a:p>
             <a:endParaRPr lang="pl-PL" dirty="0"/>
@@ -18734,7 +18642,13 @@
               <a:rPr lang="pl-PL" dirty="0" smtClean="0">
                 <a:hlinkClick r:id="rId4"/>
               </a:rPr>
-              <a:t>https://github.com/wdsr/exercise1a.git</a:t>
+              <a:t>https://</a:t>
+            </a:r>
+            <a:r>
+              <a:rPr lang="pl-PL" dirty="0" smtClean="0">
+                <a:hlinkClick r:id="rId4"/>
+              </a:rPr>
+              <a:t>github.com/leinadb/exercise1a.git</a:t>
             </a:r>
             <a:endParaRPr lang="pl-PL" dirty="0" smtClean="0"/>
           </a:p>
@@ -19130,80 +19044,69 @@
           <a:p>
             <a:r>
               <a:rPr lang="pl-PL" dirty="0" smtClean="0"/>
-              <a:t>Najpierw budujemy bibliotekę </a:t>
-            </a:r>
-            <a:r>
-              <a:rPr lang="pl-PL" dirty="0" err="1" smtClean="0"/>
-              <a:t>Conversions</a:t>
+              <a:t>Najpierw budujemy bibliotekę Conversions</a:t>
             </a:r>
             <a:r>
               <a:rPr lang="pl-PL" dirty="0" smtClean="0"/>
               <a:t>:</a:t>
             </a:r>
+            <a:endParaRPr lang="pl-PL" dirty="0" smtClean="0"/>
           </a:p>
           <a:p>
             <a:pPr lvl="1"/>
             <a:r>
-              <a:rPr lang="pl-PL" dirty="0" err="1" smtClean="0">
+              <a:rPr lang="pl-PL" sz="1000" dirty="0" smtClean="0">
                 <a:solidFill>
                   <a:schemeClr val="accent3"/>
                 </a:solidFill>
               </a:rPr>
-              <a:t>mkdir</a:t>
-            </a:r>
-            <a:r>
-              <a:rPr lang="pl-PL" dirty="0" smtClean="0">
+              <a:t>cd exercise1a\conversions</a:t>
+            </a:r>
+          </a:p>
+          <a:p>
+            <a:pPr lvl="1"/>
+            <a:r>
+              <a:rPr lang="pl-PL" sz="1000" dirty="0">
                 <a:solidFill>
                   <a:schemeClr val="accent3"/>
                 </a:solidFill>
               </a:rPr>
-              <a:t> bin</a:t>
-            </a:r>
-          </a:p>
-          <a:p>
-            <a:pPr lvl="1"/>
-            <a:r>
-              <a:rPr lang="pl-PL" dirty="0" err="1">
+              <a:t>m</a:t>
+            </a:r>
+            <a:r>
+              <a:rPr lang="pl-PL" sz="1000" dirty="0" smtClean="0">
                 <a:solidFill>
                   <a:schemeClr val="accent3"/>
                 </a:solidFill>
               </a:rPr>
-              <a:t>javac</a:t>
-            </a:r>
-            <a:r>
-              <a:rPr lang="pl-PL" dirty="0">
+              <a:t>kdir bin</a:t>
+            </a:r>
+            <a:endParaRPr lang="pl-PL" sz="1000" dirty="0" smtClean="0">
+              <a:solidFill>
+                <a:schemeClr val="accent3"/>
+              </a:solidFill>
+            </a:endParaRPr>
+          </a:p>
+          <a:p>
+            <a:pPr lvl="1"/>
+            <a:r>
+              <a:rPr lang="pl-PL" sz="1000" dirty="0">
                 <a:solidFill>
                   <a:schemeClr val="accent3"/>
                 </a:solidFill>
               </a:rPr>
-              <a:t> </a:t>
-            </a:r>
-            <a:r>
-              <a:rPr lang="pl-PL" dirty="0" err="1">
+              <a:t>javac </a:t>
+            </a:r>
+            <a:r>
+              <a:rPr lang="pl-PL" sz="1000" dirty="0" smtClean="0">
                 <a:solidFill>
                   <a:schemeClr val="accent3"/>
                 </a:solidFill>
               </a:rPr>
-              <a:t>wdsr</a:t>
-            </a:r>
-            <a:r>
-              <a:rPr lang="pl-PL" dirty="0">
-                <a:solidFill>
-                  <a:schemeClr val="accent3"/>
-                </a:solidFill>
-              </a:rPr>
-              <a:t>\exercise1\</a:t>
-            </a:r>
-            <a:r>
-              <a:rPr lang="pl-PL" dirty="0" err="1">
-                <a:solidFill>
-                  <a:schemeClr val="accent3"/>
-                </a:solidFill>
-              </a:rPr>
-              <a:t>conversions</a:t>
-            </a:r>
-            <a:r>
-              <a:rPr lang="pl-PL" dirty="0">
+              <a:t>wdsr\exercise1\conversions</a:t>
+            </a:r>
+            <a:r>
+              <a:rPr lang="pl-PL" sz="1000" dirty="0">
                 <a:solidFill>
                   <a:schemeClr val="accent3"/>
                 </a:solidFill>
@@ -19211,7 +19114,7 @@
               <a:t>\*.* -d </a:t>
             </a:r>
             <a:r>
-              <a:rPr lang="pl-PL" dirty="0" smtClean="0">
+              <a:rPr lang="pl-PL" sz="1000" dirty="0" smtClean="0">
                 <a:solidFill>
                   <a:schemeClr val="accent3"/>
                 </a:solidFill>
@@ -19222,30 +19125,19 @@
           <a:p>
             <a:pPr lvl="2"/>
             <a:r>
-              <a:rPr lang="pl-PL" dirty="0" smtClean="0"/>
-              <a:t>Ten krok kompiluje pliki źródłowe (*.</a:t>
-            </a:r>
-            <a:r>
-              <a:rPr lang="pl-PL" dirty="0" err="1" smtClean="0"/>
-              <a:t>java</a:t>
-            </a:r>
-            <a:r>
-              <a:rPr lang="pl-PL" dirty="0" smtClean="0"/>
-              <a:t>) i umieszcza skompilowane pliki (*.</a:t>
-            </a:r>
-            <a:r>
-              <a:rPr lang="pl-PL" dirty="0" err="1" smtClean="0"/>
-              <a:t>class</a:t>
-            </a:r>
-            <a:r>
-              <a:rPr lang="pl-PL" dirty="0" smtClean="0"/>
-              <a:t>) w katalogu „bin”.</a:t>
-            </a:r>
+              <a:rPr lang="pl-PL" sz="1000" dirty="0" smtClean="0"/>
+              <a:t>Ten krok kompiluje pliki źródłowe (*.java) i umieszcza skompilowane pliki (*.class) w katalogu „bin</a:t>
+            </a:r>
+            <a:r>
+              <a:rPr lang="pl-PL" sz="1000" dirty="0" smtClean="0"/>
+              <a:t>”. </a:t>
+            </a:r>
+            <a:endParaRPr lang="pl-PL" sz="1000" dirty="0" smtClean="0"/>
           </a:p>
           <a:p>
             <a:pPr lvl="1"/>
             <a:r>
-              <a:rPr lang="pl-PL" dirty="0">
+              <a:rPr lang="pl-PL" sz="1000" dirty="0">
                 <a:solidFill>
                   <a:schemeClr val="accent3"/>
                 </a:solidFill>
@@ -19253,7 +19145,7 @@
               <a:t>jar </a:t>
             </a:r>
             <a:r>
-              <a:rPr lang="pl-PL" dirty="0" err="1">
+              <a:rPr lang="pl-PL" sz="1000" dirty="0" err="1">
                 <a:solidFill>
                   <a:schemeClr val="accent3"/>
                 </a:solidFill>
@@ -19261,7 +19153,7 @@
               <a:t>cvf</a:t>
             </a:r>
             <a:r>
-              <a:rPr lang="pl-PL" dirty="0">
+              <a:rPr lang="pl-PL" sz="1000" dirty="0">
                 <a:solidFill>
                   <a:schemeClr val="accent3"/>
                 </a:solidFill>
@@ -19269,7 +19161,7 @@
               <a:t> conversions-1.0.jar -C bin </a:t>
             </a:r>
             <a:r>
-              <a:rPr lang="pl-PL" dirty="0" smtClean="0">
+              <a:rPr lang="pl-PL" sz="1000" dirty="0" smtClean="0">
                 <a:solidFill>
                   <a:schemeClr val="accent3"/>
                 </a:solidFill>
@@ -19280,7 +19172,7 @@
           <a:p>
             <a:pPr lvl="2"/>
             <a:r>
-              <a:rPr lang="pl-PL" dirty="0" smtClean="0"/>
+              <a:rPr lang="pl-PL" sz="1000" dirty="0" smtClean="0"/>
               <a:t>Ten krok tworzy plik biblioteczny (conversions-1.0.jar) ze skompilowanych plików z katalogu „bin”</a:t>
             </a:r>
           </a:p>
@@ -19830,21 +19722,42 @@
           <a:p>
             <a:pPr lvl="1"/>
             <a:r>
-              <a:rPr lang="pl-PL" dirty="0" err="1" smtClean="0">
+              <a:rPr lang="pl-PL">
                 <a:solidFill>
                   <a:schemeClr val="accent3"/>
                 </a:solidFill>
               </a:rPr>
-              <a:t>mkdir</a:t>
-            </a:r>
+              <a:t>cd </a:t>
+            </a:r>
+            <a:r>
+              <a:rPr lang="pl-PL" smtClean="0">
+                <a:solidFill>
+                  <a:schemeClr val="accent3"/>
+                </a:solidFill>
+              </a:rPr>
+              <a:t>exercise1a\calculator</a:t>
+            </a:r>
+            <a:endParaRPr lang="pl-PL" dirty="0" smtClean="0">
+              <a:solidFill>
+                <a:schemeClr val="accent3"/>
+              </a:solidFill>
+            </a:endParaRPr>
+          </a:p>
+          <a:p>
+            <a:pPr lvl="1"/>
             <a:r>
               <a:rPr lang="pl-PL" dirty="0" smtClean="0">
                 <a:solidFill>
                   <a:schemeClr val="accent3"/>
                 </a:solidFill>
               </a:rPr>
-              <a:t> bin</a:t>
-            </a:r>
+              <a:t>mkdir bin</a:t>
+            </a:r>
+            <a:endParaRPr lang="pl-PL" dirty="0" smtClean="0">
+              <a:solidFill>
+                <a:schemeClr val="accent3"/>
+              </a:solidFill>
+            </a:endParaRPr>
           </a:p>
           <a:p>
             <a:pPr lvl="1"/>
@@ -20425,7 +20338,7 @@
   <a:extraClrSchemeLst/>
   <a:extLst>
     <a:ext uri="{05A4C25C-085E-4340-85A3-A5531E510DB2}">
-      <thm15:themeFamily xmlns:thm15="http://schemas.microsoft.com/office/thememl/2012/main" xmlns="" name="GFT_Chartpool_2015.pptx" id="{A28C9458-9558-44C8-89F4-D7A2CBC04405}" vid="{0F156D25-70FA-498B-891B-4FDE46BF1046}"/>
+      <thm15:themeFamily xmlns:thm15="http://schemas.microsoft.com/office/thememl/2012/main" name="GFT_Chartpool_2015.pptx" id="{A28C9458-9558-44C8-89F4-D7A2CBC04405}" vid="{0F156D25-70FA-498B-891B-4FDE46BF1046}"/>
     </a:ext>
   </a:extLst>
 </a:theme>
@@ -21072,15 +20985,6 @@
 </file>
 
 <file path=customXml/item1.xml><?xml version="1.0" encoding="utf-8"?>
-<?mso-contentType ?>
-<FormTemplates xmlns="http://schemas.microsoft.com/sharepoint/v3/contenttype/forms">
-  <Display>DocumentLibraryForm</Display>
-  <Edit>DocumentLibraryForm</Edit>
-  <New>DocumentLibraryForm</New>
-</FormTemplates>
-</file>
-
-<file path=customXml/item2.xml><?xml version="1.0" encoding="utf-8"?>
 <ct:contentTypeSchema xmlns:ct="http://schemas.microsoft.com/office/2006/metadata/contentType" xmlns:ma="http://schemas.microsoft.com/office/2006/metadata/properties/metaAttributes" ct:_="" ma:_="" ma:contentTypeName="Document" ma:contentTypeID="0x010100793B9935CA02AD4F90F0A0FD564FDD82" ma:contentTypeVersion="17" ma:contentTypeDescription="Create a new document." ma:contentTypeScope="" ma:versionID="6168266ad0b2c1ccdc9d2ae0268a5eb6">
   <xsd:schema xmlns:xsd="http://www.w3.org/2001/XMLSchema" xmlns:xs="http://www.w3.org/2001/XMLSchema" xmlns:p="http://schemas.microsoft.com/office/2006/metadata/properties" xmlns:ns2="e44e039f-c551-4112-981c-456f1b630ef1" xmlns:ns3="727178e8-9586-4f49-8e7b-77af9c2fb085" targetNamespace="http://schemas.microsoft.com/office/2006/metadata/properties" ma:root="true" ma:fieldsID="b9b29daf9bb73cd90369de1b0e977594" ns2:_="" ns3:_="">
     <xsd:import namespace="e44e039f-c551-4112-981c-456f1b630ef1"/>
@@ -21577,7 +21481,51 @@
 </ct:contentTypeSchema>
 </file>
 
+<file path=customXml/item2.xml><?xml version="1.0" encoding="utf-8"?>
+<?mso-contentType ?>
+<FormTemplates xmlns="http://schemas.microsoft.com/sharepoint/v3/contenttype/forms">
+  <Display>DocumentLibraryForm</Display>
+  <Edit>DocumentLibraryForm</Edit>
+  <New>DocumentLibraryForm</New>
+</FormTemplates>
+</file>
+
 <file path=customXml/item3.xml><?xml version="1.0" encoding="utf-8"?>
+<p:properties xmlns:p="http://schemas.microsoft.com/office/2006/metadata/properties" xmlns:xsi="http://www.w3.org/2001/XMLSchema-instance" xmlns:pc="http://schemas.microsoft.com/office/infopath/2007/PartnerControls">
+  <documentManagement>
+    <_dlc_DocId xmlns="727178e8-9586-4f49-8e7b-77af9c2fb085">CVD5QAC74SYH-2-13943</_dlc_DocId>
+    <_dlc_DocIdUrl xmlns="727178e8-9586-4f49-8e7b-77af9c2fb085">
+      <Url>https://share.gft.com/sites/Corporate-Marketing/_layouts/DocIdRedir.aspx?ID=CVD5QAC74SYH-2-13943</Url>
+      <Description>CVD5QAC74SYH-2-13943</Description>
+    </_dlc_DocIdUrl>
+    <Functional_x0020_Area xmlns="e44e039f-c551-4112-981c-456f1b630ef1">Functional Area 1</Functional_x0020_Area>
+    <Reference_x0020_Title xmlns="e44e039f-c551-4112-981c-456f1b630ef1" xsi:nil="true"/>
+    <Area xmlns="e44e039f-c551-4112-981c-456f1b630ef1">Area 1</Area>
+    <Project_x0020_size_x0020__x0028_resources_x0029_ xmlns="e44e039f-c551-4112-981c-456f1b630ef1" xsi:nil="true"/>
+    <Comments xmlns="e44e039f-c551-4112-981c-456f1b630ef1" xsi:nil="true"/>
+    <Business_x0020_Sector xmlns="e44e039f-c551-4112-981c-456f1b630ef1">Banking</Business_x0020_Sector>
+    <Client_x0020_Category xmlns="e44e039f-c551-4112-981c-456f1b630ef1">Central</Client_x0020_Category>
+    <Methods_x0020_and_x0020_standards xmlns="e44e039f-c551-4112-981c-456f1b630ef1" xsi:nil="true"/>
+    <Responsible xmlns="e44e039f-c551-4112-981c-456f1b630ef1">Marek Strejczek</Responsible>
+    <Client_x0020_Name xmlns="e44e039f-c551-4112-981c-456f1b630ef1" xsi:nil="true"/>
+    <Client_x0020_approval xmlns="e44e039f-c551-4112-981c-456f1b630ef1">No</Client_x0020_approval>
+    <Plattform_x0020__x0026__x0020_tools xmlns="e44e039f-c551-4112-981c-456f1b630ef1" xsi:nil="true"/>
+    <Project_x0020_ID xmlns="e44e039f-c551-4112-981c-456f1b630ef1" xsi:nil="true"/>
+    <Description0 xmlns="e44e039f-c551-4112-981c-456f1b630ef1" xsi:nil="true"/>
+    <Author_x0020__x002f__x0020_Contact xmlns="e44e039f-c551-4112-981c-456f1b630ef1">
+      <UserInfo>
+        <DisplayName/>
+        <AccountId xsi:nil="true"/>
+        <AccountType/>
+      </UserInfo>
+    </Author_x0020__x002f__x0020_Contact>
+    <Client_x0020_Country xmlns="e44e039f-c551-4112-981c-456f1b630ef1">Germany</Client_x0020_Country>
+    <Year xmlns="e44e039f-c551-4112-981c-456f1b630ef1" xsi:nil="true"/>
+  </documentManagement>
+</p:properties>
+</file>
+
+<file path=customXml/item4.xml><?xml version="1.0" encoding="utf-8"?>
 <?mso-contentType ?>
 <spe:Receivers xmlns:spe="http://schemas.microsoft.com/sharepoint/events">
   <Receiver>
@@ -21623,50 +21571,7 @@
 </spe:Receivers>
 </file>
 
-<file path=customXml/item4.xml><?xml version="1.0" encoding="utf-8"?>
-<p:properties xmlns:p="http://schemas.microsoft.com/office/2006/metadata/properties" xmlns:xsi="http://www.w3.org/2001/XMLSchema-instance" xmlns:pc="http://schemas.microsoft.com/office/infopath/2007/PartnerControls">
-  <documentManagement>
-    <_dlc_DocId xmlns="727178e8-9586-4f49-8e7b-77af9c2fb085">CVD5QAC74SYH-2-13943</_dlc_DocId>
-    <_dlc_DocIdUrl xmlns="727178e8-9586-4f49-8e7b-77af9c2fb085">
-      <Url>https://share.gft.com/sites/Corporate-Marketing/_layouts/DocIdRedir.aspx?ID=CVD5QAC74SYH-2-13943</Url>
-      <Description>CVD5QAC74SYH-2-13943</Description>
-    </_dlc_DocIdUrl>
-    <Functional_x0020_Area xmlns="e44e039f-c551-4112-981c-456f1b630ef1">Functional Area 1</Functional_x0020_Area>
-    <Reference_x0020_Title xmlns="e44e039f-c551-4112-981c-456f1b630ef1" xsi:nil="true"/>
-    <Area xmlns="e44e039f-c551-4112-981c-456f1b630ef1">Area 1</Area>
-    <Project_x0020_size_x0020__x0028_resources_x0029_ xmlns="e44e039f-c551-4112-981c-456f1b630ef1" xsi:nil="true"/>
-    <Comments xmlns="e44e039f-c551-4112-981c-456f1b630ef1" xsi:nil="true"/>
-    <Business_x0020_Sector xmlns="e44e039f-c551-4112-981c-456f1b630ef1">Banking</Business_x0020_Sector>
-    <Client_x0020_Category xmlns="e44e039f-c551-4112-981c-456f1b630ef1">Central</Client_x0020_Category>
-    <Methods_x0020_and_x0020_standards xmlns="e44e039f-c551-4112-981c-456f1b630ef1" xsi:nil="true"/>
-    <Responsible xmlns="e44e039f-c551-4112-981c-456f1b630ef1">Marek Strejczek</Responsible>
-    <Client_x0020_Name xmlns="e44e039f-c551-4112-981c-456f1b630ef1" xsi:nil="true"/>
-    <Client_x0020_approval xmlns="e44e039f-c551-4112-981c-456f1b630ef1">No</Client_x0020_approval>
-    <Plattform_x0020__x0026__x0020_tools xmlns="e44e039f-c551-4112-981c-456f1b630ef1" xsi:nil="true"/>
-    <Project_x0020_ID xmlns="e44e039f-c551-4112-981c-456f1b630ef1" xsi:nil="true"/>
-    <Description0 xmlns="e44e039f-c551-4112-981c-456f1b630ef1" xsi:nil="true"/>
-    <Author_x0020__x002f__x0020_Contact xmlns="e44e039f-c551-4112-981c-456f1b630ef1">
-      <UserInfo>
-        <DisplayName/>
-        <AccountId xsi:nil="true"/>
-        <AccountType/>
-      </UserInfo>
-    </Author_x0020__x002f__x0020_Contact>
-    <Client_x0020_Country xmlns="e44e039f-c551-4112-981c-456f1b630ef1">Germany</Client_x0020_Country>
-    <Year xmlns="e44e039f-c551-4112-981c-456f1b630ef1" xsi:nil="true"/>
-  </documentManagement>
-</p:properties>
-</file>
-
 <file path=customXml/itemProps1.xml><?xml version="1.0" encoding="utf-8"?>
-<ds:datastoreItem xmlns:ds="http://schemas.openxmlformats.org/officeDocument/2006/customXml" ds:itemID="{9217953E-6BB7-40C6-9A84-608D0A8D65EC}">
-  <ds:schemaRefs>
-    <ds:schemaRef ds:uri="http://schemas.microsoft.com/sharepoint/v3/contenttype/forms"/>
-  </ds:schemaRefs>
-</ds:datastoreItem>
-</file>
-
-<file path=customXml/itemProps2.xml><?xml version="1.0" encoding="utf-8"?>
 <ds:datastoreItem xmlns:ds="http://schemas.openxmlformats.org/officeDocument/2006/customXml" ds:itemID="{54CA1130-EAC1-4116-82E4-DF5A51FE3AEA}">
   <ds:schemaRefs>
     <ds:schemaRef ds:uri="http://schemas.microsoft.com/office/2006/metadata/contentType"/>
@@ -21685,15 +21590,15 @@
 </ds:datastoreItem>
 </file>
 
-<file path=customXml/itemProps3.xml><?xml version="1.0" encoding="utf-8"?>
-<ds:datastoreItem xmlns:ds="http://schemas.openxmlformats.org/officeDocument/2006/customXml" ds:itemID="{A6F3EA8F-EBA0-438A-80BD-6A96E2E10054}">
+<file path=customXml/itemProps2.xml><?xml version="1.0" encoding="utf-8"?>
+<ds:datastoreItem xmlns:ds="http://schemas.openxmlformats.org/officeDocument/2006/customXml" ds:itemID="{9217953E-6BB7-40C6-9A84-608D0A8D65EC}">
   <ds:schemaRefs>
-    <ds:schemaRef ds:uri="http://schemas.microsoft.com/sharepoint/events"/>
+    <ds:schemaRef ds:uri="http://schemas.microsoft.com/sharepoint/v3/contenttype/forms"/>
   </ds:schemaRefs>
 </ds:datastoreItem>
 </file>
 
-<file path=customXml/itemProps4.xml><?xml version="1.0" encoding="utf-8"?>
+<file path=customXml/itemProps3.xml><?xml version="1.0" encoding="utf-8"?>
 <ds:datastoreItem xmlns:ds="http://schemas.openxmlformats.org/officeDocument/2006/customXml" ds:itemID="{7445AAF4-B73F-4E3A-B9D2-4DDAE0F1BE8A}">
   <ds:schemaRefs>
     <ds:schemaRef ds:uri="http://purl.org/dc/dcmitype/"/>
@@ -21708,4 +21613,12 @@
     <ds:schemaRef ds:uri="http://www.w3.org/XML/1998/namespace"/>
   </ds:schemaRefs>
 </ds:datastoreItem>
+</file>
+
+<file path=customXml/itemProps4.xml><?xml version="1.0" encoding="utf-8"?>
+<ds:datastoreItem xmlns:ds="http://schemas.openxmlformats.org/officeDocument/2006/customXml" ds:itemID="{A6F3EA8F-EBA0-438A-80BD-6A96E2E10054}">
+  <ds:schemaRefs>
+    <ds:schemaRef ds:uri="http://schemas.microsoft.com/sharepoint/events"/>
+  </ds:schemaRefs>
+</ds:datastoreItem>
 </file>
</xml_diff>

<commit_message>
updates and some minor fixes
</commit_message>
<xml_diff>
--- a/WDSR - ćwiczenie 1.pptx
+++ b/WDSR - ćwiczenie 1.pptx
@@ -40,9 +40,9 @@
     <p:sldId id="365" r:id="rId32"/>
     <p:sldId id="366" r:id="rId33"/>
     <p:sldId id="367" r:id="rId34"/>
-    <p:sldId id="368" r:id="rId35"/>
-    <p:sldId id="372" r:id="rId36"/>
-    <p:sldId id="373" r:id="rId37"/>
+    <p:sldId id="372" r:id="rId35"/>
+    <p:sldId id="373" r:id="rId36"/>
+    <p:sldId id="391" r:id="rId37"/>
     <p:sldId id="383" r:id="rId38"/>
     <p:sldId id="384" r:id="rId39"/>
     <p:sldId id="377" r:id="rId40"/>
@@ -2890,7 +2890,7 @@
     </p:spTree>
     <p:extLst>
       <p:ext uri="{BB962C8B-B14F-4D97-AF65-F5344CB8AC3E}">
-        <p14:creationId xmlns:p14="http://schemas.microsoft.com/office/powerpoint/2010/main" val="1883132698"/>
+        <p14:creationId xmlns:p14="http://schemas.microsoft.com/office/powerpoint/2010/main" val="105924859"/>
       </p:ext>
     </p:extLst>
   </p:cSld>
@@ -6477,7 +6477,7 @@
           <a:graphicData uri="http://schemas.openxmlformats.org/presentationml/2006/ole">
             <mc:AlternateContent xmlns:mc="http://schemas.openxmlformats.org/markup-compatibility/2006">
               <mc:Choice xmlns:v="urn:schemas-microsoft-com:vml" Requires="v">
-                <p:oleObj spid="_x0000_s2201" name="think-cell Folie" r:id="rId4" imgW="305" imgH="303" progId="TCLayout.ActiveDocument.1">
+                <p:oleObj spid="_x0000_s2204" name="think-cell Folie" r:id="rId4" imgW="305" imgH="303" progId="TCLayout.ActiveDocument.1">
                   <p:embed/>
                 </p:oleObj>
               </mc:Choice>
@@ -6874,7 +6874,7 @@
           <a:graphicData uri="http://schemas.openxmlformats.org/presentationml/2006/ole">
             <mc:AlternateContent xmlns:mc="http://schemas.openxmlformats.org/markup-compatibility/2006">
               <mc:Choice xmlns:v="urn:schemas-microsoft-com:vml" Requires="v">
-                <p:oleObj spid="_x0000_s1182" name="think-cell Folie" r:id="rId13" imgW="305" imgH="303" progId="TCLayout.ActiveDocument.1">
+                <p:oleObj spid="_x0000_s1185" name="think-cell Folie" r:id="rId13" imgW="305" imgH="303" progId="TCLayout.ActiveDocument.1">
                   <p:embed/>
                 </p:oleObj>
               </mc:Choice>
@@ -11578,7 +11578,7 @@
         <p:spPr>
           <a:xfrm>
             <a:off x="638827" y="1018979"/>
-            <a:ext cx="4799391" cy="553998"/>
+            <a:ext cx="4799391" cy="923330"/>
           </a:xfrm>
           <a:prstGeom prst="rect">
             <a:avLst/>
@@ -11618,12 +11618,24 @@
           </a:p>
           <a:p>
             <a:r>
+              <a:rPr lang="pl-PL" sz="1200" dirty="0" smtClean="0">
+                <a:hlinkClick r:id="rId5"/>
+              </a:rPr>
+              <a:t>http://download.eclipse.org/buildship/updates/e45/releases/1.0</a:t>
+            </a:r>
+            <a:endParaRPr lang="pl-PL" sz="1200" dirty="0" smtClean="0"/>
+          </a:p>
+          <a:p>
+            <a:r>
               <a:rPr lang="pl-PL" sz="1200" dirty="0" smtClean="0"/>
-              <a:t>http</a:t>
-            </a:r>
+              <a:t>lub</a:t>
+            </a:r>
+            <a:endParaRPr lang="pl-PL" sz="1200" dirty="0" smtClean="0"/>
+          </a:p>
+          <a:p>
             <a:r>
               <a:rPr lang="pl-PL" sz="1200" dirty="0"/>
-              <a:t>://download.eclipse.org/buildship/updates/e45/releases/1.0</a:t>
+              <a:t>http://download.eclipse.org/buildship/updates/e46/releases/2.x/</a:t>
             </a:r>
             <a:endParaRPr lang="pl-PL" sz="1200" dirty="0" smtClean="0"/>
           </a:p>
@@ -13455,142 +13467,105 @@
             <p:ph type="title"/>
           </p:nvPr>
         </p:nvSpPr>
+        <p:spPr/>
+        <p:txBody>
+          <a:bodyPr/>
+          <a:lstStyle/>
+          <a:p>
+            <a:r>
+              <a:rPr lang="pl-PL" dirty="0" smtClean="0"/>
+              <a:t>Zakres ćwiczenia</a:t>
+            </a:r>
+            <a:endParaRPr lang="de-DE" dirty="0"/>
+          </a:p>
+        </p:txBody>
+      </p:sp>
+      <p:sp>
+        <p:nvSpPr>
+          <p:cNvPr id="5" name="Inhaltsplatzhalter 4"/>
+          <p:cNvSpPr>
+            <a:spLocks noGrp="1"/>
+          </p:cNvSpPr>
+          <p:nvPr>
+            <p:ph type="body" sz="quarter" idx="13"/>
+          </p:nvPr>
+        </p:nvSpPr>
+        <p:spPr/>
+        <p:txBody>
+          <a:bodyPr/>
+          <a:lstStyle/>
+          <a:p>
+            <a:r>
+              <a:rPr lang="pl-PL" dirty="0" smtClean="0"/>
+              <a:t>ĆWICZENIE 1C</a:t>
+            </a:r>
+            <a:endParaRPr lang="de-DE" dirty="0"/>
+          </a:p>
+        </p:txBody>
+      </p:sp>
+      <p:sp>
+        <p:nvSpPr>
+          <p:cNvPr id="3" name="Prostokąt zaokrąglony 2"/>
+          <p:cNvSpPr/>
+          <p:nvPr/>
+        </p:nvSpPr>
         <p:spPr>
           <a:xfrm>
-            <a:off x="444503" y="347341"/>
-            <a:ext cx="6692104" cy="436017"/>
+            <a:off x="1609595" y="1546963"/>
+            <a:ext cx="5730657" cy="1991639"/>
           </a:xfrm>
-        </p:spPr>
-        <p:txBody>
-          <a:bodyPr/>
-          <a:lstStyle/>
-          <a:p>
-            <a:r>
-              <a:rPr lang="pl-PL" dirty="0" smtClean="0"/>
-              <a:t>Uruchomienie zaimportowanego projektu w IDE</a:t>
-            </a:r>
-            <a:br>
-              <a:rPr lang="pl-PL" dirty="0" smtClean="0"/>
-            </a:br>
-            <a:r>
-              <a:rPr lang="pl-PL" dirty="0" smtClean="0"/>
-              <a:t>Ustawienie parametrów wywołania</a:t>
-            </a:r>
-            <a:endParaRPr lang="de-DE" dirty="0"/>
-          </a:p>
-        </p:txBody>
-      </p:sp>
-      <p:sp>
-        <p:nvSpPr>
-          <p:cNvPr id="5" name="Inhaltsplatzhalter 4"/>
-          <p:cNvSpPr>
-            <a:spLocks noGrp="1"/>
-          </p:cNvSpPr>
-          <p:nvPr>
-            <p:ph type="body" sz="quarter" idx="13"/>
-          </p:nvPr>
-        </p:nvSpPr>
-        <p:spPr/>
-        <p:txBody>
-          <a:bodyPr/>
-          <a:lstStyle/>
-          <a:p>
-            <a:r>
-              <a:rPr lang="pl-PL" dirty="0" smtClean="0"/>
-              <a:t>ĆWICZENIE 1B</a:t>
-            </a:r>
-            <a:endParaRPr lang="de-DE" dirty="0"/>
-          </a:p>
-        </p:txBody>
-      </p:sp>
-      <p:sp>
-        <p:nvSpPr>
-          <p:cNvPr id="2" name="Symbol zastępczy zawartości 1"/>
-          <p:cNvSpPr>
-            <a:spLocks noGrp="1"/>
-          </p:cNvSpPr>
-          <p:nvPr>
-            <p:ph idx="1"/>
-          </p:nvPr>
-        </p:nvSpPr>
-        <p:spPr>
-          <a:xfrm>
-            <a:off x="449264" y="1018979"/>
-            <a:ext cx="8005098" cy="3362325"/>
-          </a:xfrm>
-        </p:spPr>
-        <p:txBody>
-          <a:bodyPr/>
-          <a:lstStyle/>
-          <a:p>
-            <a:pPr marL="0" indent="0">
-              <a:buNone/>
-            </a:pPr>
-            <a:endParaRPr lang="pl-PL" dirty="0" smtClean="0"/>
-          </a:p>
-          <a:p>
-            <a:endParaRPr lang="pl-PL" dirty="0" smtClean="0"/>
-          </a:p>
-        </p:txBody>
-      </p:sp>
-      <p:pic>
-        <p:nvPicPr>
-          <p:cNvPr id="10242" name="Picture 2"/>
-          <p:cNvPicPr>
-            <a:picLocks noChangeAspect="1" noChangeArrowheads="1"/>
-          </p:cNvPicPr>
-          <p:nvPr/>
-        </p:nvPicPr>
-        <p:blipFill>
-          <a:blip r:embed="rId3">
-            <a:extLst>
-              <a:ext uri="{28A0092B-C50C-407E-A947-70E740481C1C}">
-                <a14:useLocalDpi xmlns:a14="http://schemas.microsoft.com/office/drawing/2010/main" val="0"/>
-              </a:ext>
-            </a:extLst>
-          </a:blip>
-          <a:srcRect/>
-          <a:stretch>
-            <a:fillRect/>
-          </a:stretch>
-        </p:blipFill>
-        <p:spPr bwMode="auto">
-          <a:xfrm>
-            <a:off x="414338" y="1966913"/>
-            <a:ext cx="8315325" cy="1209675"/>
-          </a:xfrm>
-          <a:prstGeom prst="rect">
+          <a:prstGeom prst="roundRect">
             <a:avLst/>
           </a:prstGeom>
-          <a:noFill/>
-          <a:ln>
-            <a:noFill/>
-          </a:ln>
-          <a:extLst>
-            <a:ext uri="{909E8E84-426E-40DD-AFC4-6F175D3DCCD1}">
-              <a14:hiddenFill xmlns:a14="http://schemas.microsoft.com/office/drawing/2010/main">
-                <a:solidFill>
-                  <a:schemeClr val="accent1"/>
-                </a:solidFill>
-              </a14:hiddenFill>
-            </a:ext>
-            <a:ext uri="{91240B29-F687-4F45-9708-019B960494DF}">
-              <a14:hiddenLine xmlns:a14="http://schemas.microsoft.com/office/drawing/2010/main" w="9525">
+          <a:ln/>
+        </p:spPr>
+        <p:style>
+          <a:lnRef idx="2">
+            <a:schemeClr val="accent3">
+              <a:shade val="50000"/>
+            </a:schemeClr>
+          </a:lnRef>
+          <a:fillRef idx="1">
+            <a:schemeClr val="accent3"/>
+          </a:fillRef>
+          <a:effectRef idx="0">
+            <a:schemeClr val="accent3"/>
+          </a:effectRef>
+          <a:fontRef idx="minor">
+            <a:schemeClr val="lt1"/>
+          </a:fontRef>
+        </p:style>
+        <p:txBody>
+          <a:bodyPr lIns="108000" tIns="108000" rIns="108000" bIns="108000" rtlCol="0" anchor="ctr"/>
+          <a:lstStyle/>
+          <a:p>
+            <a:pPr algn="ctr"/>
+            <a:r>
+              <a:rPr lang="pl-PL" sz="1600" dirty="0" smtClean="0">
                 <a:solidFill>
                   <a:schemeClr val="tx1"/>
                 </a:solidFill>
-                <a:miter lim="800000"/>
-                <a:headEnd/>
-                <a:tailEnd/>
-              </a14:hiddenLine>
-            </a:ext>
-          </a:extLst>
-        </p:spPr>
-      </p:pic>
+              </a:rPr>
+              <a:t>Ćwiczenie 1C</a:t>
+            </a:r>
+          </a:p>
+          <a:p>
+            <a:pPr lvl="1" algn="ctr"/>
+            <a:r>
+              <a:rPr lang="pl-PL" sz="1600" dirty="0">
+                <a:solidFill>
+                  <a:schemeClr val="bg1"/>
+                </a:solidFill>
+              </a:rPr>
+              <a:t>Dodanie logowania do aplikacji</a:t>
+            </a:r>
+          </a:p>
+        </p:txBody>
+      </p:sp>
     </p:spTree>
     <p:extLst>
       <p:ext uri="{BB962C8B-B14F-4D97-AF65-F5344CB8AC3E}">
-        <p14:creationId xmlns:p14="http://schemas.microsoft.com/office/powerpoint/2010/main" val="2410062733"/>
+        <p14:creationId xmlns:p14="http://schemas.microsoft.com/office/powerpoint/2010/main" val="202376434"/>
       </p:ext>
     </p:extLst>
   </p:cSld>
@@ -13599,7 +13574,7 @@
   </p:clrMapOvr>
   <mc:AlternateContent xmlns:mc="http://schemas.openxmlformats.org/markup-compatibility/2006" xmlns:p14="http://schemas.microsoft.com/office/powerpoint/2010/main">
     <mc:Choice Requires="p14">
-      <p:transition p14:dur="0"/>
+      <p:transition p14:dur="10"/>
     </mc:Choice>
     <mc:Fallback xmlns="">
       <p:transition/>
@@ -13649,156 +13624,6 @@
           <a:p>
             <a:r>
               <a:rPr lang="pl-PL" dirty="0" smtClean="0"/>
-              <a:t>Zakres ćwiczenia</a:t>
-            </a:r>
-            <a:endParaRPr lang="de-DE" dirty="0"/>
-          </a:p>
-        </p:txBody>
-      </p:sp>
-      <p:sp>
-        <p:nvSpPr>
-          <p:cNvPr id="5" name="Inhaltsplatzhalter 4"/>
-          <p:cNvSpPr>
-            <a:spLocks noGrp="1"/>
-          </p:cNvSpPr>
-          <p:nvPr>
-            <p:ph type="body" sz="quarter" idx="13"/>
-          </p:nvPr>
-        </p:nvSpPr>
-        <p:spPr/>
-        <p:txBody>
-          <a:bodyPr/>
-          <a:lstStyle/>
-          <a:p>
-            <a:r>
-              <a:rPr lang="pl-PL" dirty="0" smtClean="0"/>
-              <a:t>ĆWICZENIE 1C</a:t>
-            </a:r>
-            <a:endParaRPr lang="de-DE" dirty="0"/>
-          </a:p>
-        </p:txBody>
-      </p:sp>
-      <p:sp>
-        <p:nvSpPr>
-          <p:cNvPr id="3" name="Prostokąt zaokrąglony 2"/>
-          <p:cNvSpPr/>
-          <p:nvPr/>
-        </p:nvSpPr>
-        <p:spPr>
-          <a:xfrm>
-            <a:off x="1609595" y="1546963"/>
-            <a:ext cx="5730657" cy="1991639"/>
-          </a:xfrm>
-          <a:prstGeom prst="roundRect">
-            <a:avLst/>
-          </a:prstGeom>
-          <a:ln/>
-        </p:spPr>
-        <p:style>
-          <a:lnRef idx="2">
-            <a:schemeClr val="accent3">
-              <a:shade val="50000"/>
-            </a:schemeClr>
-          </a:lnRef>
-          <a:fillRef idx="1">
-            <a:schemeClr val="accent3"/>
-          </a:fillRef>
-          <a:effectRef idx="0">
-            <a:schemeClr val="accent3"/>
-          </a:effectRef>
-          <a:fontRef idx="minor">
-            <a:schemeClr val="lt1"/>
-          </a:fontRef>
-        </p:style>
-        <p:txBody>
-          <a:bodyPr lIns="108000" tIns="108000" rIns="108000" bIns="108000" rtlCol="0" anchor="ctr"/>
-          <a:lstStyle/>
-          <a:p>
-            <a:pPr algn="ctr"/>
-            <a:r>
-              <a:rPr lang="pl-PL" sz="1600" dirty="0" smtClean="0">
-                <a:solidFill>
-                  <a:schemeClr val="tx1"/>
-                </a:solidFill>
-              </a:rPr>
-              <a:t>Ćwiczenie 1C</a:t>
-            </a:r>
-          </a:p>
-          <a:p>
-            <a:pPr lvl="1" algn="ctr"/>
-            <a:r>
-              <a:rPr lang="pl-PL" sz="1600" dirty="0">
-                <a:solidFill>
-                  <a:schemeClr val="bg1"/>
-                </a:solidFill>
-              </a:rPr>
-              <a:t>Dodanie logowania do aplikacji</a:t>
-            </a:r>
-          </a:p>
-        </p:txBody>
-      </p:sp>
-    </p:spTree>
-    <p:extLst>
-      <p:ext uri="{BB962C8B-B14F-4D97-AF65-F5344CB8AC3E}">
-        <p14:creationId xmlns:p14="http://schemas.microsoft.com/office/powerpoint/2010/main" val="202376434"/>
-      </p:ext>
-    </p:extLst>
-  </p:cSld>
-  <p:clrMapOvr>
-    <a:masterClrMapping/>
-  </p:clrMapOvr>
-  <mc:AlternateContent xmlns:mc="http://schemas.openxmlformats.org/markup-compatibility/2006" xmlns:p14="http://schemas.microsoft.com/office/powerpoint/2010/main">
-    <mc:Choice Requires="p14">
-      <p:transition p14:dur="10"/>
-    </mc:Choice>
-    <mc:Fallback xmlns="">
-      <p:transition/>
-    </mc:Fallback>
-  </mc:AlternateContent>
-  <p:timing>
-    <p:tnLst>
-      <p:par>
-        <p:cTn id="1" dur="indefinite" restart="never" nodeType="tmRoot"/>
-      </p:par>
-    </p:tnLst>
-  </p:timing>
-</p:sld>
-</file>
-
-<file path=ppt/slides/slide32.xml><?xml version="1.0" encoding="utf-8"?>
-<p:sld xmlns:a="http://schemas.openxmlformats.org/drawingml/2006/main" xmlns:r="http://schemas.openxmlformats.org/officeDocument/2006/relationships" xmlns:p="http://schemas.openxmlformats.org/presentationml/2006/main">
-  <p:cSld>
-    <p:spTree>
-      <p:nvGrpSpPr>
-        <p:cNvPr id="1" name=""/>
-        <p:cNvGrpSpPr/>
-        <p:nvPr/>
-      </p:nvGrpSpPr>
-      <p:grpSpPr>
-        <a:xfrm>
-          <a:off x="0" y="0"/>
-          <a:ext cx="0" cy="0"/>
-          <a:chOff x="0" y="0"/>
-          <a:chExt cx="0" cy="0"/>
-        </a:xfrm>
-      </p:grpSpPr>
-      <p:sp>
-        <p:nvSpPr>
-          <p:cNvPr id="7" name="Titel 6"/>
-          <p:cNvSpPr>
-            <a:spLocks noGrp="1"/>
-          </p:cNvSpPr>
-          <p:nvPr>
-            <p:ph type="title"/>
-          </p:nvPr>
-        </p:nvSpPr>
-        <p:spPr/>
-        <p:txBody>
-          <a:bodyPr/>
-          <a:lstStyle/>
-          <a:p>
-            <a:r>
-              <a:rPr lang="pl-PL" dirty="0" smtClean="0"/>
               <a:t>Logowanie z Log4J 2</a:t>
             </a:r>
             <a:endParaRPr lang="de-DE" dirty="0"/>
@@ -14005,7 +13830,7 @@
 </p:sld>
 </file>
 
-<file path=ppt/slides/slide33.xml><?xml version="1.0" encoding="utf-8"?>
+<file path=ppt/slides/slide32.xml><?xml version="1.0" encoding="utf-8"?>
 <p:sld xmlns:a="http://schemas.openxmlformats.org/drawingml/2006/main" xmlns:r="http://schemas.openxmlformats.org/officeDocument/2006/relationships" xmlns:p="http://schemas.openxmlformats.org/presentationml/2006/main">
   <p:cSld>
     <p:spTree>
@@ -14203,6 +14028,149 @@
           </a:extLst>
         </p:spPr>
       </p:pic>
+    </p:spTree>
+    <p:extLst>
+      <p:ext uri="{BB962C8B-B14F-4D97-AF65-F5344CB8AC3E}">
+        <p14:creationId xmlns:p14="http://schemas.microsoft.com/office/powerpoint/2010/main" val="1506623246"/>
+      </p:ext>
+    </p:extLst>
+  </p:cSld>
+  <p:clrMapOvr>
+    <a:masterClrMapping/>
+  </p:clrMapOvr>
+  <mc:AlternateContent xmlns:mc="http://schemas.openxmlformats.org/markup-compatibility/2006" xmlns:p14="http://schemas.microsoft.com/office/powerpoint/2010/main">
+    <mc:Choice Requires="p14">
+      <p:transition p14:dur="10"/>
+    </mc:Choice>
+    <mc:Fallback xmlns="">
+      <p:transition/>
+    </mc:Fallback>
+  </mc:AlternateContent>
+  <p:timing>
+    <p:tnLst>
+      <p:par>
+        <p:cTn id="1" dur="indefinite" restart="never" nodeType="tmRoot"/>
+      </p:par>
+    </p:tnLst>
+  </p:timing>
+</p:sld>
+</file>
+
+<file path=ppt/slides/slide33.xml><?xml version="1.0" encoding="utf-8"?>
+<p:sld xmlns:a="http://schemas.openxmlformats.org/drawingml/2006/main" xmlns:r="http://schemas.openxmlformats.org/officeDocument/2006/relationships" xmlns:p="http://schemas.openxmlformats.org/presentationml/2006/main">
+  <p:cSld>
+    <p:spTree>
+      <p:nvGrpSpPr>
+        <p:cNvPr id="1" name=""/>
+        <p:cNvGrpSpPr/>
+        <p:nvPr/>
+      </p:nvGrpSpPr>
+      <p:grpSpPr>
+        <a:xfrm>
+          <a:off x="0" y="0"/>
+          <a:ext cx="0" cy="0"/>
+          <a:chOff x="0" y="0"/>
+          <a:chExt cx="0" cy="0"/>
+        </a:xfrm>
+      </p:grpSpPr>
+      <p:sp>
+        <p:nvSpPr>
+          <p:cNvPr id="7" name="Titel 6"/>
+          <p:cNvSpPr>
+            <a:spLocks noGrp="1"/>
+          </p:cNvSpPr>
+          <p:nvPr>
+            <p:ph type="title"/>
+          </p:nvPr>
+        </p:nvSpPr>
+        <p:spPr/>
+        <p:txBody>
+          <a:bodyPr/>
+          <a:lstStyle/>
+          <a:p>
+            <a:r>
+              <a:rPr lang="pl-PL" dirty="0" smtClean="0"/>
+              <a:t>Logowanie z Log4J 2</a:t>
+            </a:r>
+            <a:endParaRPr lang="de-DE" dirty="0"/>
+          </a:p>
+        </p:txBody>
+      </p:sp>
+      <p:sp>
+        <p:nvSpPr>
+          <p:cNvPr id="5" name="Inhaltsplatzhalter 4"/>
+          <p:cNvSpPr>
+            <a:spLocks noGrp="1"/>
+          </p:cNvSpPr>
+          <p:nvPr>
+            <p:ph type="body" sz="quarter" idx="13"/>
+          </p:nvPr>
+        </p:nvSpPr>
+        <p:spPr/>
+        <p:txBody>
+          <a:bodyPr/>
+          <a:lstStyle/>
+          <a:p>
+            <a:r>
+              <a:rPr lang="pl-PL" dirty="0" smtClean="0"/>
+              <a:t>ĆWICZENIE 1C</a:t>
+            </a:r>
+            <a:endParaRPr lang="de-DE" dirty="0"/>
+          </a:p>
+        </p:txBody>
+      </p:sp>
+      <p:sp>
+        <p:nvSpPr>
+          <p:cNvPr id="6" name="Symbol zastępczy zawartości 1"/>
+          <p:cNvSpPr>
+            <a:spLocks noGrp="1"/>
+          </p:cNvSpPr>
+          <p:nvPr>
+            <p:ph idx="1"/>
+          </p:nvPr>
+        </p:nvSpPr>
+        <p:spPr>
+          <a:xfrm>
+            <a:off x="443707" y="1119188"/>
+            <a:ext cx="6153520" cy="865400"/>
+          </a:xfrm>
+        </p:spPr>
+        <p:txBody>
+          <a:bodyPr/>
+          <a:lstStyle/>
+          <a:p>
+            <a:r>
+              <a:rPr lang="pl-PL" dirty="0" smtClean="0"/>
+              <a:t>Dodanie zależności:</a:t>
+            </a:r>
+          </a:p>
+          <a:p>
+            <a:pPr lvl="1"/>
+            <a:r>
+              <a:rPr lang="pl-PL" dirty="0"/>
+              <a:t>compile group: 'org.apache.logging.log4j', name: 'log4j-api', version: '2.8'</a:t>
+            </a:r>
+          </a:p>
+          <a:p>
+            <a:pPr lvl="1"/>
+            <a:r>
+              <a:rPr lang="pl-PL" dirty="0" smtClean="0"/>
+              <a:t>runtime </a:t>
+            </a:r>
+            <a:r>
+              <a:rPr lang="pl-PL" dirty="0"/>
+              <a:t>group: 'org.apache.logging.log4j', name: 'log4j-core', version: '2.8'</a:t>
+            </a:r>
+            <a:endParaRPr lang="pl-PL" dirty="0"/>
+          </a:p>
+          <a:p>
+            <a:endParaRPr lang="pl-PL" dirty="0" smtClean="0"/>
+          </a:p>
+          <a:p>
+            <a:endParaRPr lang="pl-PL" dirty="0" smtClean="0"/>
+          </a:p>
+        </p:txBody>
+      </p:sp>
     </p:spTree>
     <p:extLst>
       <p:ext uri="{BB962C8B-B14F-4D97-AF65-F5344CB8AC3E}">
@@ -14523,7 +14491,11 @@
             </a:r>
             <a:r>
               <a:rPr lang="pl-PL" dirty="0"/>
-              <a:t>ersji 2.5: </a:t>
+              <a:t>ersji </a:t>
+            </a:r>
+            <a:r>
+              <a:rPr lang="pl-PL" dirty="0" smtClean="0"/>
+              <a:t>2.8: </a:t>
             </a:r>
             <a:r>
               <a:rPr lang="pl-PL" dirty="0">
@@ -14643,11 +14615,7 @@
             <a:pPr lvl="1"/>
             <a:r>
               <a:rPr lang="pl-PL" dirty="0" smtClean="0"/>
-              <a:t>(jak zwykle) Kod musi znaleźć się </a:t>
-            </a:r>
-            <a:r>
-              <a:rPr lang="pl-PL" smtClean="0"/>
-              <a:t>w GitHubie.</a:t>
+              <a:t>(jak zwykle) Kod musi znaleźć się w GitHubie.</a:t>
             </a:r>
             <a:endParaRPr lang="pl-PL" dirty="0"/>
           </a:p>
@@ -17495,14 +17463,14 @@
           <a:p>
             <a:r>
               <a:rPr lang="pl-PL" dirty="0" smtClean="0"/>
-              <a:t>Marek Strejczek</a:t>
+              <a:t>Daniel Boguszewicz</a:t>
             </a:r>
             <a:endParaRPr lang="de-DE" dirty="0"/>
           </a:p>
           <a:p>
             <a:r>
               <a:rPr lang="pl-PL" dirty="0" smtClean="0"/>
-              <a:t>Technical Architect</a:t>
+              <a:t>Java Developer</a:t>
             </a:r>
             <a:endParaRPr lang="de-DE" dirty="0"/>
           </a:p>
@@ -17534,8 +17502,12 @@
           </a:p>
           <a:p>
             <a:r>
-              <a:rPr lang="pl-PL" dirty="0" err="1" smtClean="0"/>
-              <a:t>marek.strejczek</a:t>
+              <a:rPr lang="pl-PL" dirty="0"/>
+              <a:t>d</a:t>
+            </a:r>
+            <a:r>
+              <a:rPr lang="pl-PL" dirty="0" smtClean="0"/>
+              <a:t>aniel.boguszewicz</a:t>
             </a:r>
             <a:r>
               <a:rPr lang="de-DE" dirty="0" smtClean="0"/>
@@ -19722,7 +19694,7 @@
           <a:p>
             <a:pPr lvl="1"/>
             <a:r>
-              <a:rPr lang="pl-PL">
+              <a:rPr lang="pl-PL" dirty="0">
                 <a:solidFill>
                   <a:schemeClr val="accent3"/>
                 </a:solidFill>
@@ -19730,7 +19702,7 @@
               <a:t>cd </a:t>
             </a:r>
             <a:r>
-              <a:rPr lang="pl-PL" smtClean="0">
+              <a:rPr lang="pl-PL" dirty="0" smtClean="0">
                 <a:solidFill>
                   <a:schemeClr val="accent3"/>
                 </a:solidFill>
@@ -19753,6 +19725,17 @@
               </a:rPr>
               <a:t>mkdir bin</a:t>
             </a:r>
+          </a:p>
+          <a:p>
+            <a:pPr lvl="1"/>
+            <a:r>
+              <a:rPr lang="pl-PL" dirty="0" smtClean="0">
+                <a:solidFill>
+                  <a:schemeClr val="accent3"/>
+                </a:solidFill>
+              </a:rPr>
+              <a:t>Otwórz klase Calculator.java oraz Main.java i zastanów się czy poniższym poleceniem kod się skompiluje.</a:t>
+            </a:r>
             <a:endParaRPr lang="pl-PL" dirty="0" smtClean="0">
               <a:solidFill>
                 <a:schemeClr val="accent3"/>
@@ -19822,16 +19805,21 @@
             <a:pPr lvl="2"/>
             <a:r>
               <a:rPr lang="pl-PL" dirty="0" smtClean="0"/>
-              <a:t>Ta operacja się nie uda – kompilator nie może znaleźć zależności (biblioteki </a:t>
-            </a:r>
-            <a:r>
-              <a:rPr lang="pl-PL" dirty="0" err="1" smtClean="0"/>
-              <a:t>Conversions</a:t>
-            </a:r>
-            <a:r>
-              <a:rPr lang="pl-PL" dirty="0" smtClean="0"/>
-              <a:t> oraz Commons-Lang3)</a:t>
-            </a:r>
+              <a:t>Ta operacja się nie uda – kompilator nie może znaleźć </a:t>
+            </a:r>
+            <a:r>
+              <a:rPr lang="pl-PL" dirty="0" smtClean="0"/>
+              <a:t>zależności: Conversions </a:t>
+            </a:r>
+            <a:r>
+              <a:rPr lang="pl-PL" dirty="0" smtClean="0"/>
+              <a:t>oraz </a:t>
+            </a:r>
+            <a:r>
+              <a:rPr lang="pl-PL" dirty="0" smtClean="0"/>
+              <a:t>Commons-Lang3</a:t>
+            </a:r>
+            <a:endParaRPr lang="pl-PL" dirty="0" smtClean="0"/>
           </a:p>
           <a:p>
             <a:pPr lvl="1"/>
@@ -19883,20 +19871,20 @@
           <a:p>
             <a:pPr lvl="1"/>
             <a:r>
+              <a:rPr lang="pl-PL" dirty="0">
+                <a:solidFill>
+                  <a:schemeClr val="accent3"/>
+                </a:solidFill>
+              </a:rPr>
+              <a:t>javac -classpath lib\*;..\conversions\bin wdsr\exercise1\*.java </a:t>
+            </a:r>
+            <a:r>
               <a:rPr lang="pl-PL" dirty="0" smtClean="0">
                 <a:solidFill>
                   <a:schemeClr val="accent3"/>
                 </a:solidFill>
               </a:rPr>
-              <a:t>javac -classpath ..\conversions\bin;lib\commons-lang3-3.4.jar;. </a:t>
-            </a:r>
-            <a:r>
-              <a:rPr lang="pl-PL" dirty="0" err="1">
-                <a:solidFill>
-                  <a:schemeClr val="accent3"/>
-                </a:solidFill>
-              </a:rPr>
-              <a:t>wdsr</a:t>
+              <a:t>wdsr\exercise1\*.java </a:t>
             </a:r>
             <a:r>
               <a:rPr lang="pl-PL" dirty="0">
@@ -19904,23 +19892,7 @@
                   <a:schemeClr val="accent3"/>
                 </a:solidFill>
               </a:rPr>
-              <a:t>\exercise1\*.</a:t>
-            </a:r>
-            <a:r>
-              <a:rPr lang="pl-PL" dirty="0" err="1">
-                <a:solidFill>
-                  <a:schemeClr val="accent3"/>
-                </a:solidFill>
-              </a:rPr>
-              <a:t>java</a:t>
-            </a:r>
-            <a:r>
-              <a:rPr lang="pl-PL" dirty="0">
-                <a:solidFill>
-                  <a:schemeClr val="accent3"/>
-                </a:solidFill>
-              </a:rPr>
-              <a:t> -d </a:t>
+              <a:t>wdsr\exercise1\logic\*.java -d </a:t>
             </a:r>
             <a:r>
               <a:rPr lang="pl-PL" dirty="0" smtClean="0">
@@ -19928,15 +19900,25 @@
                   <a:schemeClr val="accent3"/>
                 </a:solidFill>
               </a:rPr>
-              <a:t>bin</a:t>
-            </a:r>
+              <a:t>bin </a:t>
+            </a:r>
+            <a:endParaRPr lang="pl-PL" dirty="0"/>
           </a:p>
           <a:p>
             <a:pPr lvl="2"/>
             <a:r>
               <a:rPr lang="pl-PL" dirty="0" smtClean="0"/>
-              <a:t>Kompilacja ze wskazaniem zależności (classpath)</a:t>
-            </a:r>
+              <a:t>Kompilacja </a:t>
+            </a:r>
+            <a:r>
+              <a:rPr lang="pl-PL" dirty="0" smtClean="0"/>
+              <a:t>ze wskazaniem </a:t>
+            </a:r>
+            <a:r>
+              <a:rPr lang="pl-PL" dirty="0" smtClean="0"/>
+              <a:t>zależności: classpath</a:t>
+            </a:r>
+            <a:endParaRPr lang="pl-PL" dirty="0" smtClean="0"/>
           </a:p>
           <a:p>
             <a:pPr lvl="1"/>

</xml_diff>

<commit_message>
minor changes to 1e task requirements to avoid ambiguity
</commit_message>
<xml_diff>
--- a/WDSR - ćwiczenie 1.pptx
+++ b/WDSR - ćwiczenie 1.pptx
@@ -6477,7 +6477,7 @@
           <a:graphicData uri="http://schemas.openxmlformats.org/presentationml/2006/ole">
             <mc:AlternateContent xmlns:mc="http://schemas.openxmlformats.org/markup-compatibility/2006">
               <mc:Choice xmlns:v="urn:schemas-microsoft-com:vml" Requires="v">
-                <p:oleObj spid="_x0000_s2204" name="think-cell Folie" r:id="rId4" imgW="305" imgH="303" progId="TCLayout.ActiveDocument.1">
+                <p:oleObj spid="_x0000_s2205" name="think-cell Folie" r:id="rId4" imgW="305" imgH="303" progId="TCLayout.ActiveDocument.1">
                   <p:embed/>
                 </p:oleObj>
               </mc:Choice>
@@ -6874,7 +6874,7 @@
           <a:graphicData uri="http://schemas.openxmlformats.org/presentationml/2006/ole">
             <mc:AlternateContent xmlns:mc="http://schemas.openxmlformats.org/markup-compatibility/2006">
               <mc:Choice xmlns:v="urn:schemas-microsoft-com:vml" Requires="v">
-                <p:oleObj spid="_x0000_s1185" name="think-cell Folie" r:id="rId13" imgW="305" imgH="303" progId="TCLayout.ActiveDocument.1">
+                <p:oleObj spid="_x0000_s1186" name="think-cell Folie" r:id="rId13" imgW="305" imgH="303" progId="TCLayout.ActiveDocument.1">
                   <p:embed/>
                 </p:oleObj>
               </mc:Choice>
@@ -17340,7 +17340,15 @@
             <a:pPr lvl="1"/>
             <a:r>
               <a:rPr lang="pl-PL" dirty="0" smtClean="0"/>
-              <a:t>Zaimplementuj poprawnie testy, które powodują błędy podczas budowania.</a:t>
+              <a:t>Dokończ implementacje testów </a:t>
+            </a:r>
+            <a:r>
+              <a:rPr lang="pl-PL" smtClean="0"/>
+              <a:t>używając biblioteki Mockito</a:t>
+            </a:r>
+            <a:r>
+              <a:rPr lang="pl-PL" dirty="0" smtClean="0"/>
+              <a:t>.</a:t>
             </a:r>
             <a:endParaRPr lang="pl-PL" dirty="0"/>
           </a:p>
@@ -17353,21 +17361,30 @@
           <a:p>
             <a:r>
               <a:rPr lang="pl-PL" dirty="0" smtClean="0"/>
-              <a:t>Inne informacje:</a:t>
+              <a:t>Inne informacje</a:t>
+            </a:r>
+            <a:r>
+              <a:rPr lang="pl-PL" dirty="0" smtClean="0"/>
+              <a:t>:</a:t>
             </a:r>
           </a:p>
           <a:p>
             <a:pPr lvl="1"/>
             <a:r>
               <a:rPr lang="pl-PL" dirty="0" smtClean="0"/>
-              <a:t>Komenda „gradlew build” musi się uruchamiać bez błędów.</a:t>
-            </a:r>
+              <a:t>gradlew build konczy sie sukcesem.</a:t>
+            </a:r>
+            <a:endParaRPr lang="pl-PL" dirty="0" smtClean="0"/>
           </a:p>
           <a:p>
             <a:pPr lvl="1"/>
             <a:r>
               <a:rPr lang="pl-PL" dirty="0" smtClean="0"/>
-              <a:t>(jak zwykle) Kod musi znaleźć się w GitHubie.</a:t>
+              <a:t>(</a:t>
+            </a:r>
+            <a:r>
+              <a:rPr lang="pl-PL" dirty="0" smtClean="0"/>
+              <a:t>jak zwykle) Kod musi znaleźć się w GitHubie.</a:t>
             </a:r>
           </a:p>
           <a:p>

</xml_diff>

<commit_message>
adjustment to my repo
</commit_message>
<xml_diff>
--- a/WDSR - ćwiczenie 1.pptx
+++ b/WDSR - ćwiczenie 1.pptx
@@ -287,7 +287,7 @@
             <a:fld id="{C4843D26-F355-3844-A4EF-19D4FD875597}" type="datetimeFigureOut">
               <a:rPr lang="de-DE" smtClean="0"/>
               <a:pPr/>
-              <a:t>18.02.2017</a:t>
+              <a:t>22.02.2017</a:t>
             </a:fld>
             <a:endParaRPr lang="de-DE" dirty="0"/>
           </a:p>
@@ -455,7 +455,7 @@
             <a:fld id="{8E2CFE12-C1FB-D740-8B6C-AFB72D5D4002}" type="datetimeFigureOut">
               <a:rPr lang="de-DE" smtClean="0"/>
               <a:pPr/>
-              <a:t>18.02.2017</a:t>
+              <a:t>22.02.2017</a:t>
             </a:fld>
             <a:endParaRPr lang="de-DE" dirty="0"/>
           </a:p>
@@ -6477,7 +6477,7 @@
           <a:graphicData uri="http://schemas.openxmlformats.org/presentationml/2006/ole">
             <mc:AlternateContent xmlns:mc="http://schemas.openxmlformats.org/markup-compatibility/2006">
               <mc:Choice xmlns:v="urn:schemas-microsoft-com:vml" Requires="v">
-                <p:oleObj spid="_x0000_s2205" name="think-cell Folie" r:id="rId4" imgW="305" imgH="303" progId="TCLayout.ActiveDocument.1">
+                <p:oleObj spid="_x0000_s2207" name="think-cell Folie" r:id="rId4" imgW="305" imgH="303" progId="TCLayout.ActiveDocument.1">
                   <p:embed/>
                 </p:oleObj>
               </mc:Choice>
@@ -6874,7 +6874,7 @@
           <a:graphicData uri="http://schemas.openxmlformats.org/presentationml/2006/ole">
             <mc:AlternateContent xmlns:mc="http://schemas.openxmlformats.org/markup-compatibility/2006">
               <mc:Choice xmlns:v="urn:schemas-microsoft-com:vml" Requires="v">
-                <p:oleObj spid="_x0000_s1186" name="think-cell Folie" r:id="rId13" imgW="305" imgH="303" progId="TCLayout.ActiveDocument.1">
+                <p:oleObj spid="_x0000_s1188" name="think-cell Folie" r:id="rId13" imgW="305" imgH="303" progId="TCLayout.ActiveDocument.1">
                   <p:embed/>
                 </p:oleObj>
               </mc:Choice>
@@ -8200,8 +8200,8 @@
         </p:nvSpPr>
         <p:spPr>
           <a:xfrm>
-            <a:off x="976312" y="4178885"/>
-            <a:ext cx="5232400" cy="507831"/>
+            <a:off x="976312" y="4009608"/>
+            <a:ext cx="5232400" cy="677108"/>
           </a:xfrm>
         </p:spPr>
         <p:txBody>
@@ -8210,6 +8210,12 @@
           <a:p>
             <a:r>
               <a:rPr lang="pl-PL" dirty="0" smtClean="0"/>
+              <a:t>Autor : Marek Strejczek</a:t>
+            </a:r>
+          </a:p>
+          <a:p>
+            <a:r>
+              <a:rPr lang="pl-PL" dirty="0" smtClean="0"/>
               <a:t>Prowdzący: Daniel Boguszewicz</a:t>
             </a:r>
             <a:endParaRPr lang="de-DE" dirty="0" smtClean="0"/>
@@ -8217,22 +8223,13 @@
           <a:p>
             <a:r>
               <a:rPr lang="pl-PL" dirty="0" smtClean="0"/>
-              <a:t>Lato </a:t>
-            </a:r>
-            <a:r>
-              <a:rPr lang="pl-PL" dirty="0" smtClean="0"/>
-              <a:t>2017</a:t>
-            </a:r>
-            <a:endParaRPr lang="pl-PL" dirty="0" smtClean="0"/>
-          </a:p>
-          <a:p>
-            <a:r>
-              <a:rPr lang="pl-PL" dirty="0" smtClean="0"/>
-              <a:t>Wersja </a:t>
-            </a:r>
-            <a:r>
-              <a:rPr lang="pl-PL" dirty="0" smtClean="0"/>
-              <a:t>1.1</a:t>
+              <a:t>Lato 2017</a:t>
+            </a:r>
+          </a:p>
+          <a:p>
+            <a:r>
+              <a:rPr lang="pl-PL" dirty="0" smtClean="0"/>
+              <a:t>Wersja 1.1</a:t>
             </a:r>
             <a:endParaRPr lang="de-DE" dirty="0"/>
           </a:p>
@@ -8870,7 +8867,7 @@
               <a:rPr lang="pl-PL" dirty="0" smtClean="0">
                 <a:hlinkClick r:id="rId3"/>
               </a:rPr>
-              <a:t>github.com/wdsr/exercise1b.git</a:t>
+              <a:t>github.com/leinadb/exercise1b.git</a:t>
             </a:r>
             <a:endParaRPr lang="pl-PL" dirty="0" smtClean="0"/>
           </a:p>
@@ -11630,7 +11627,6 @@
               <a:rPr lang="pl-PL" sz="1200" dirty="0" smtClean="0"/>
               <a:t>lub</a:t>
             </a:r>
-            <a:endParaRPr lang="pl-PL" sz="1200" dirty="0" smtClean="0"/>
           </a:p>
           <a:p>
             <a:r>
@@ -13930,7 +13926,7 @@
               <a:rPr lang="pl-PL" dirty="0" smtClean="0">
                 <a:hlinkClick r:id="rId3"/>
               </a:rPr>
-              <a:t>github.com/wdsr/exercise1c.git</a:t>
+              <a:t>github.com/leinadb/exercise1c.git</a:t>
             </a:r>
             <a:endParaRPr lang="pl-PL" dirty="0" smtClean="0"/>
           </a:p>
@@ -14161,7 +14157,6 @@
               <a:rPr lang="pl-PL" dirty="0"/>
               <a:t>group: 'org.apache.logging.log4j', name: 'log4j-core', version: '2.8'</a:t>
             </a:r>
-            <a:endParaRPr lang="pl-PL" dirty="0"/>
           </a:p>
           <a:p>
             <a:endParaRPr lang="pl-PL" dirty="0" smtClean="0"/>
@@ -15159,7 +15154,7 @@
               <a:rPr lang="pl-PL" dirty="0" smtClean="0">
                 <a:hlinkClick r:id="rId3"/>
               </a:rPr>
-              <a:t>github.com/wdsr/exercise1d.git</a:t>
+              <a:t>github.com/leinadb/exercise1d.git</a:t>
             </a:r>
             <a:endParaRPr lang="pl-PL" dirty="0" smtClean="0"/>
           </a:p>
@@ -17109,7 +17104,7 @@
               <a:rPr lang="pl-PL" dirty="0" smtClean="0">
                 <a:hlinkClick r:id="rId3"/>
               </a:rPr>
-              <a:t>github.com/wdsr/exercise1e.git</a:t>
+              <a:t>github.com/leinadb/exercise1e.git</a:t>
             </a:r>
             <a:endParaRPr lang="pl-PL" dirty="0" smtClean="0"/>
           </a:p>
@@ -17361,11 +17356,7 @@
           <a:p>
             <a:r>
               <a:rPr lang="pl-PL" dirty="0" smtClean="0"/>
-              <a:t>Inne informacje</a:t>
-            </a:r>
-            <a:r>
-              <a:rPr lang="pl-PL" dirty="0" smtClean="0"/>
-              <a:t>:</a:t>
+              <a:t>Inne informacje:</a:t>
             </a:r>
           </a:p>
           <a:p>
@@ -17374,17 +17365,12 @@
               <a:rPr lang="pl-PL" dirty="0" smtClean="0"/>
               <a:t>gradlew build konczy sie sukcesem.</a:t>
             </a:r>
-            <a:endParaRPr lang="pl-PL" dirty="0" smtClean="0"/>
           </a:p>
           <a:p>
             <a:pPr lvl="1"/>
             <a:r>
               <a:rPr lang="pl-PL" dirty="0" smtClean="0"/>
-              <a:t>(</a:t>
-            </a:r>
-            <a:r>
-              <a:rPr lang="pl-PL" dirty="0" smtClean="0"/>
-              <a:t>jak zwykle) Kod musi znaleźć się w GitHubie.</a:t>
+              <a:t>(jak zwykle) Kod musi znaleźć się w GitHubie.</a:t>
             </a:r>
           </a:p>
           <a:p>
@@ -18631,13 +18617,7 @@
               <a:rPr lang="pl-PL" dirty="0" smtClean="0">
                 <a:hlinkClick r:id="rId4"/>
               </a:rPr>
-              <a:t>https://</a:t>
-            </a:r>
-            <a:r>
-              <a:rPr lang="pl-PL" dirty="0" smtClean="0">
-                <a:hlinkClick r:id="rId4"/>
-              </a:rPr>
-              <a:t>github.com/leinadb/exercise1a.git</a:t>
+              <a:t>https://github.com/leinadb/exercise1a.git</a:t>
             </a:r>
             <a:endParaRPr lang="pl-PL" dirty="0" smtClean="0"/>
           </a:p>
@@ -19033,13 +19013,8 @@
           <a:p>
             <a:r>
               <a:rPr lang="pl-PL" dirty="0" smtClean="0"/>
-              <a:t>Najpierw budujemy bibliotekę Conversions</a:t>
-            </a:r>
-            <a:r>
-              <a:rPr lang="pl-PL" dirty="0" smtClean="0"/>
-              <a:t>:</a:t>
-            </a:r>
-            <a:endParaRPr lang="pl-PL" dirty="0" smtClean="0"/>
+              <a:t>Najpierw budujemy bibliotekę Conversions:</a:t>
+            </a:r>
           </a:p>
           <a:p>
             <a:pPr lvl="1"/>
@@ -19070,11 +19045,6 @@
               </a:rPr>
               <a:t>kdir bin</a:t>
             </a:r>
-            <a:endParaRPr lang="pl-PL" sz="1000" dirty="0" smtClean="0">
-              <a:solidFill>
-                <a:schemeClr val="accent3"/>
-              </a:solidFill>
-            </a:endParaRPr>
           </a:p>
           <a:p>
             <a:pPr lvl="1"/>
@@ -19115,13 +19085,8 @@
             <a:pPr lvl="2"/>
             <a:r>
               <a:rPr lang="pl-PL" sz="1000" dirty="0" smtClean="0"/>
-              <a:t>Ten krok kompiluje pliki źródłowe (*.java) i umieszcza skompilowane pliki (*.class) w katalogu „bin</a:t>
-            </a:r>
-            <a:r>
-              <a:rPr lang="pl-PL" sz="1000" dirty="0" smtClean="0"/>
-              <a:t>”. </a:t>
-            </a:r>
-            <a:endParaRPr lang="pl-PL" sz="1000" dirty="0" smtClean="0"/>
+              <a:t>Ten krok kompiluje pliki źródłowe (*.java) i umieszcza skompilowane pliki (*.class) w katalogu „bin”. </a:t>
+            </a:r>
           </a:p>
           <a:p>
             <a:pPr lvl="1"/>
@@ -19726,11 +19691,6 @@
               </a:rPr>
               <a:t>exercise1a\calculator</a:t>
             </a:r>
-            <a:endParaRPr lang="pl-PL" dirty="0" smtClean="0">
-              <a:solidFill>
-                <a:schemeClr val="accent3"/>
-              </a:solidFill>
-            </a:endParaRPr>
           </a:p>
           <a:p>
             <a:pPr lvl="1"/>
@@ -19753,11 +19713,6 @@
               </a:rPr>
               <a:t>Otwórz klase Calculator.java oraz Main.java i zastanów się czy poniższym poleceniem kod się skompiluje.</a:t>
             </a:r>
-            <a:endParaRPr lang="pl-PL" dirty="0" smtClean="0">
-              <a:solidFill>
-                <a:schemeClr val="accent3"/>
-              </a:solidFill>
-            </a:endParaRPr>
           </a:p>
           <a:p>
             <a:pPr lvl="1"/>
@@ -19822,21 +19777,8 @@
             <a:pPr lvl="2"/>
             <a:r>
               <a:rPr lang="pl-PL" dirty="0" smtClean="0"/>
-              <a:t>Ta operacja się nie uda – kompilator nie może znaleźć </a:t>
-            </a:r>
-            <a:r>
-              <a:rPr lang="pl-PL" dirty="0" smtClean="0"/>
-              <a:t>zależności: Conversions </a:t>
-            </a:r>
-            <a:r>
-              <a:rPr lang="pl-PL" dirty="0" smtClean="0"/>
-              <a:t>oraz </a:t>
-            </a:r>
-            <a:r>
-              <a:rPr lang="pl-PL" dirty="0" smtClean="0"/>
-              <a:t>Commons-Lang3</a:t>
-            </a:r>
-            <a:endParaRPr lang="pl-PL" dirty="0" smtClean="0"/>
+              <a:t>Ta operacja się nie uda – kompilator nie może znaleźć zależności: Conversions oraz Commons-Lang3</a:t>
+            </a:r>
           </a:p>
           <a:p>
             <a:pPr lvl="1"/>
@@ -19925,17 +19867,8 @@
             <a:pPr lvl="2"/>
             <a:r>
               <a:rPr lang="pl-PL" dirty="0" smtClean="0"/>
-              <a:t>Kompilacja </a:t>
-            </a:r>
-            <a:r>
-              <a:rPr lang="pl-PL" dirty="0" smtClean="0"/>
-              <a:t>ze wskazaniem </a:t>
-            </a:r>
-            <a:r>
-              <a:rPr lang="pl-PL" dirty="0" smtClean="0"/>
-              <a:t>zależności: classpath</a:t>
-            </a:r>
-            <a:endParaRPr lang="pl-PL" dirty="0" smtClean="0"/>
+              <a:t>Kompilacja ze wskazaniem zależności: classpath</a:t>
+            </a:r>
           </a:p>
           <a:p>
             <a:pPr lvl="1"/>

</xml_diff>